<commit_message>
Updated the last slide deck to include links
</commit_message>
<xml_diff>
--- a/06-Explore, transform, and load data into the Data Warehouse using Apache Spark.pptx
+++ b/06-Explore, transform, and load data into the Data Warehouse using Apache Spark.pptx
@@ -1070,7 +1070,7 @@
           <a:p>
             <a:fld id="{2B56BDA5-FBCC-43E1-957B-02AF36889AD5}" type="datetimeFigureOut">
               <a:rPr lang="en-US" smtClean="0"/>
-              <a:t>4/3/2022</a:t>
+              <a:t>12/2/2022</a:t>
             </a:fld>
             <a:endParaRPr lang="en-US" dirty="0"/>
           </a:p>
@@ -1247,7 +1247,7 @@
           <a:p>
             <a:fld id="{8F44CDF0-0D54-4AFE-B409-D6358A9BB9A1}" type="datetimeFigureOut">
               <a:rPr lang="en-US" smtClean="0"/>
-              <a:t>4/3/2022</a:t>
+              <a:t>12/2/2022</a:t>
             </a:fld>
             <a:endParaRPr lang="en-US" dirty="0"/>
           </a:p>
@@ -22301,7 +22301,7 @@
           <a:p>
             <a:r>
               <a:rPr lang="en-US" dirty="0"/>
-              <a:t>4</a:t>
+              <a:t>3</a:t>
             </a:r>
           </a:p>
         </p:txBody>
@@ -22903,7 +22903,7 @@
           <a:p>
             <a:r>
               <a:rPr lang="en-US"/>
-              <a:t>LAB 5: </a:t>
+              <a:t>LAB 4: </a:t>
             </a:r>
             <a:r>
               <a:rPr lang="en-GB" dirty="0"/>
@@ -23031,7 +23031,7 @@
             </a:pPr>
             <a:r>
               <a:rPr lang="en-IE" b="0" dirty="0"/>
-              <a:t>Understanding big data engineering with Apache Spark in Azure Synapse Analytics</a:t>
+              <a:t>Ingesting data with Apache Spark notebooks in Azure Synapse Analytics</a:t>
             </a:r>
           </a:p>
           <a:p>
@@ -23039,10 +23039,7 @@
               <a:buFont typeface="Arial" panose="020B0604020202020204" pitchFamily="34" charset="0"/>
               <a:buChar char="•"/>
             </a:pPr>
-            <a:r>
-              <a:rPr lang="en-IE" b="0" dirty="0"/>
-              <a:t>Ingesting data with Apache Spark notebooks in Azure Synapse Analytics</a:t>
-            </a:r>
+            <a:endParaRPr lang="en-IE" b="0" dirty="0"/>
           </a:p>
           <a:p>
             <a:pPr>
@@ -23053,6 +23050,13 @@
               <a:rPr lang="en-IE" b="0" dirty="0"/>
               <a:t>Transforming data with DataFrames in Spark pools in Azure Synapse Analytics</a:t>
             </a:r>
+          </a:p>
+          <a:p>
+            <a:pPr>
+              <a:buFont typeface="Arial" panose="020B0604020202020204" pitchFamily="34" charset="0"/>
+              <a:buChar char="•"/>
+            </a:pPr>
+            <a:endParaRPr lang="en-IE" b="0" dirty="0"/>
           </a:p>
           <a:p>
             <a:pPr>
@@ -23139,7 +23143,7 @@
 </file>
 
 <file path=ppt/slides/slide3.xml><?xml version="1.0" encoding="utf-8"?>
-<p:sld xmlns:a="http://schemas.openxmlformats.org/drawingml/2006/main" xmlns:r="http://schemas.openxmlformats.org/officeDocument/2006/relationships" xmlns:p="http://schemas.openxmlformats.org/presentationml/2006/main">
+<p:sld xmlns:a="http://schemas.openxmlformats.org/drawingml/2006/main" xmlns:r="http://schemas.openxmlformats.org/officeDocument/2006/relationships" xmlns:p="http://schemas.openxmlformats.org/presentationml/2006/main" show="0">
   <p:cSld>
     <p:spTree>
       <p:nvGrpSpPr>
@@ -23262,7 +23266,7 @@
 </file>
 
 <file path=ppt/slides/slide4.xml><?xml version="1.0" encoding="utf-8"?>
-<p:sld xmlns:a="http://schemas.openxmlformats.org/drawingml/2006/main" xmlns:r="http://schemas.openxmlformats.org/officeDocument/2006/relationships" xmlns:p="http://schemas.openxmlformats.org/presentationml/2006/main">
+<p:sld xmlns:a="http://schemas.openxmlformats.org/drawingml/2006/main" xmlns:r="http://schemas.openxmlformats.org/officeDocument/2006/relationships" xmlns:p="http://schemas.openxmlformats.org/presentationml/2006/main" show="0">
   <p:cSld>
     <p:spTree>
       <p:nvGrpSpPr>
@@ -27613,7 +27617,7 @@
 </file>
 
 <file path=ppt/slides/slide5.xml><?xml version="1.0" encoding="utf-8"?>
-<p:sld xmlns:a="http://schemas.openxmlformats.org/drawingml/2006/main" xmlns:r="http://schemas.openxmlformats.org/officeDocument/2006/relationships" xmlns:p="http://schemas.openxmlformats.org/presentationml/2006/main">
+<p:sld xmlns:a="http://schemas.openxmlformats.org/drawingml/2006/main" xmlns:r="http://schemas.openxmlformats.org/officeDocument/2006/relationships" xmlns:p="http://schemas.openxmlformats.org/presentationml/2006/main" show="0">
   <p:cSld>
     <p:spTree>
       <p:nvGrpSpPr>
@@ -27819,7 +27823,7 @@
           <a:p>
             <a:r>
               <a:rPr lang="en-US" dirty="0"/>
-              <a:t>2</a:t>
+              <a:t>1</a:t>
             </a:r>
           </a:p>
         </p:txBody>
@@ -28806,7 +28810,7 @@
           <a:p>
             <a:r>
               <a:rPr lang="en-US" dirty="0"/>
-              <a:t>3</a:t>
+              <a:t>2</a:t>
             </a:r>
           </a:p>
         </p:txBody>

</xml_diff>